<commit_message>
updated backlog + added edit for all events
</commit_message>
<xml_diff>
--- a/Backlog/Week 6/Prezentare sapt 6.pptx
+++ b/Backlog/Week 6/Prezentare sapt 6.pptx
@@ -634,7 +634,7 @@
           <a:p>
             <a:fld id="{7AEF502B-3C85-45E1-9FB1-F31792C079F5}" type="datetimeFigureOut">
               <a:rPr lang="ro-RO" smtClean="0"/>
-              <a:t>31.05.2017</a:t>
+              <a:t>01.06.2017</a:t>
             </a:fld>
             <a:endParaRPr lang="ro-RO"/>
           </a:p>
@@ -930,7 +930,7 @@
           <a:p>
             <a:fld id="{7AEF502B-3C85-45E1-9FB1-F31792C079F5}" type="datetimeFigureOut">
               <a:rPr lang="ro-RO" smtClean="0"/>
-              <a:t>31.05.2017</a:t>
+              <a:t>01.06.2017</a:t>
             </a:fld>
             <a:endParaRPr lang="ro-RO"/>
           </a:p>
@@ -1178,7 +1178,7 @@
           <a:p>
             <a:fld id="{7AEF502B-3C85-45E1-9FB1-F31792C079F5}" type="datetimeFigureOut">
               <a:rPr lang="ro-RO" smtClean="0"/>
-              <a:t>31.05.2017</a:t>
+              <a:t>01.06.2017</a:t>
             </a:fld>
             <a:endParaRPr lang="ro-RO"/>
           </a:p>
@@ -1718,7 +1718,7 @@
           <a:p>
             <a:fld id="{7AEF502B-3C85-45E1-9FB1-F31792C079F5}" type="datetimeFigureOut">
               <a:rPr lang="ro-RO" smtClean="0"/>
-              <a:t>31.05.2017</a:t>
+              <a:t>01.06.2017</a:t>
             </a:fld>
             <a:endParaRPr lang="ro-RO"/>
           </a:p>
@@ -1966,7 +1966,7 @@
           <a:p>
             <a:fld id="{7AEF502B-3C85-45E1-9FB1-F31792C079F5}" type="datetimeFigureOut">
               <a:rPr lang="ro-RO" smtClean="0"/>
-              <a:t>31.05.2017</a:t>
+              <a:t>01.06.2017</a:t>
             </a:fld>
             <a:endParaRPr lang="ro-RO"/>
           </a:p>
@@ -2498,7 +2498,7 @@
           <a:p>
             <a:fld id="{7AEF502B-3C85-45E1-9FB1-F31792C079F5}" type="datetimeFigureOut">
               <a:rPr lang="ro-RO" smtClean="0"/>
-              <a:t>31.05.2017</a:t>
+              <a:t>01.06.2017</a:t>
             </a:fld>
             <a:endParaRPr lang="ro-RO"/>
           </a:p>
@@ -2795,7 +2795,7 @@
           <a:p>
             <a:fld id="{7AEF502B-3C85-45E1-9FB1-F31792C079F5}" type="datetimeFigureOut">
               <a:rPr lang="ro-RO" smtClean="0"/>
-              <a:t>31.05.2017</a:t>
+              <a:t>01.06.2017</a:t>
             </a:fld>
             <a:endParaRPr lang="ro-RO"/>
           </a:p>
@@ -2969,7 +2969,7 @@
           <a:p>
             <a:fld id="{7AEF502B-3C85-45E1-9FB1-F31792C079F5}" type="datetimeFigureOut">
               <a:rPr lang="ro-RO" smtClean="0"/>
-              <a:t>31.05.2017</a:t>
+              <a:t>01.06.2017</a:t>
             </a:fld>
             <a:endParaRPr lang="ro-RO"/>
           </a:p>
@@ -3149,7 +3149,7 @@
           <a:p>
             <a:fld id="{7AEF502B-3C85-45E1-9FB1-F31792C079F5}" type="datetimeFigureOut">
               <a:rPr lang="ro-RO" smtClean="0"/>
-              <a:t>31.05.2017</a:t>
+              <a:t>01.06.2017</a:t>
             </a:fld>
             <a:endParaRPr lang="ro-RO"/>
           </a:p>
@@ -3319,7 +3319,7 @@
           <a:p>
             <a:fld id="{7AEF502B-3C85-45E1-9FB1-F31792C079F5}" type="datetimeFigureOut">
               <a:rPr lang="ro-RO" smtClean="0"/>
-              <a:t>31.05.2017</a:t>
+              <a:t>01.06.2017</a:t>
             </a:fld>
             <a:endParaRPr lang="ro-RO"/>
           </a:p>
@@ -3570,7 +3570,7 @@
           <a:p>
             <a:fld id="{7AEF502B-3C85-45E1-9FB1-F31792C079F5}" type="datetimeFigureOut">
               <a:rPr lang="ro-RO" smtClean="0"/>
-              <a:t>31.05.2017</a:t>
+              <a:t>01.06.2017</a:t>
             </a:fld>
             <a:endParaRPr lang="ro-RO"/>
           </a:p>
@@ -3867,7 +3867,7 @@
           <a:p>
             <a:fld id="{7AEF502B-3C85-45E1-9FB1-F31792C079F5}" type="datetimeFigureOut">
               <a:rPr lang="ro-RO" smtClean="0"/>
-              <a:t>31.05.2017</a:t>
+              <a:t>01.06.2017</a:t>
             </a:fld>
             <a:endParaRPr lang="ro-RO"/>
           </a:p>
@@ -4309,7 +4309,7 @@
           <a:p>
             <a:fld id="{7AEF502B-3C85-45E1-9FB1-F31792C079F5}" type="datetimeFigureOut">
               <a:rPr lang="ro-RO" smtClean="0"/>
-              <a:t>31.05.2017</a:t>
+              <a:t>01.06.2017</a:t>
             </a:fld>
             <a:endParaRPr lang="ro-RO"/>
           </a:p>
@@ -4427,7 +4427,7 @@
           <a:p>
             <a:fld id="{7AEF502B-3C85-45E1-9FB1-F31792C079F5}" type="datetimeFigureOut">
               <a:rPr lang="ro-RO" smtClean="0"/>
-              <a:t>31.05.2017</a:t>
+              <a:t>01.06.2017</a:t>
             </a:fld>
             <a:endParaRPr lang="ro-RO"/>
           </a:p>
@@ -4522,7 +4522,7 @@
           <a:p>
             <a:fld id="{7AEF502B-3C85-45E1-9FB1-F31792C079F5}" type="datetimeFigureOut">
               <a:rPr lang="ro-RO" smtClean="0"/>
-              <a:t>31.05.2017</a:t>
+              <a:t>01.06.2017</a:t>
             </a:fld>
             <a:endParaRPr lang="ro-RO"/>
           </a:p>
@@ -4805,7 +4805,7 @@
           <a:p>
             <a:fld id="{7AEF502B-3C85-45E1-9FB1-F31792C079F5}" type="datetimeFigureOut">
               <a:rPr lang="ro-RO" smtClean="0"/>
-              <a:t>31.05.2017</a:t>
+              <a:t>01.06.2017</a:t>
             </a:fld>
             <a:endParaRPr lang="ro-RO"/>
           </a:p>
@@ -5096,7 +5096,7 @@
           <a:p>
             <a:fld id="{7AEF502B-3C85-45E1-9FB1-F31792C079F5}" type="datetimeFigureOut">
               <a:rPr lang="ro-RO" smtClean="0"/>
-              <a:t>31.05.2017</a:t>
+              <a:t>01.06.2017</a:t>
             </a:fld>
             <a:endParaRPr lang="ro-RO"/>
           </a:p>
@@ -5626,7 +5626,7 @@
           <a:p>
             <a:fld id="{7AEF502B-3C85-45E1-9FB1-F31792C079F5}" type="datetimeFigureOut">
               <a:rPr lang="ro-RO" smtClean="0"/>
-              <a:t>31.05.2017</a:t>
+              <a:t>01.06.2017</a:t>
             </a:fld>
             <a:endParaRPr lang="ro-RO"/>
           </a:p>
@@ -6415,11 +6415,7 @@
           <a:p>
             <a:r>
               <a:rPr lang="en-US" dirty="0" smtClean="0"/>
-              <a:t>PBI – </a:t>
-            </a:r>
-            <a:r>
-              <a:rPr lang="en-US" dirty="0" smtClean="0"/>
-              <a:t>Synchronizing with Module 1</a:t>
+              <a:t>PBI – Synchronizing with Module 1</a:t>
             </a:r>
             <a:endParaRPr lang="ro-RO" dirty="0"/>
           </a:p>
@@ -6478,23 +6474,18 @@
                   </a:outerShdw>
                 </a:effectLst>
               </a:rPr>
-              <a:t>Definition of </a:t>
-            </a:r>
+              <a:t>Definition of ready</a:t>
+            </a:r>
+          </a:p>
+          <a:p>
             <a:r>
               <a:rPr lang="en-US" sz="2000" dirty="0" smtClean="0">
                 <a:ln w="0"/>
                 <a:solidFill>
-                  <a:schemeClr val="accent1"/>
-                </a:solidFill>
-                <a:effectLst>
-                  <a:outerShdw blurRad="38100" dist="38100" dir="2700000" algn="tl">
-                    <a:srgbClr val="000000">
-                      <a:alpha val="43137"/>
-                    </a:srgbClr>
-                  </a:outerShdw>
-                </a:effectLst>
-              </a:rPr>
-              <a:t>ready</a:t>
+                  <a:schemeClr val="tx1"/>
+                </a:solidFill>
+              </a:rPr>
+              <a:t>Discussing and properly understanding Module 1’s approach</a:t>
             </a:r>
           </a:p>
           <a:p>
@@ -6505,7 +6496,7 @@
                   <a:schemeClr val="tx1"/>
                 </a:solidFill>
               </a:rPr>
-              <a:t>Discussing and properly understanding Module 1’s approach</a:t>
+              <a:t>Understanding our role and limitations in our relationship</a:t>
             </a:r>
           </a:p>
           <a:p>
@@ -6516,25 +6507,8 @@
                   <a:schemeClr val="tx1"/>
                 </a:solidFill>
               </a:rPr>
-              <a:t>Understanding our role and limitations in our relationship</a:t>
-            </a:r>
-          </a:p>
-          <a:p>
-            <a:r>
-              <a:rPr lang="en-US" sz="2000" dirty="0" smtClean="0">
-                <a:ln w="0"/>
-                <a:solidFill>
-                  <a:schemeClr val="tx1"/>
-                </a:solidFill>
-              </a:rPr>
               <a:t>Analyzing Module 1’s implementation and documentation (Spring, Swagger)</a:t>
             </a:r>
-            <a:endParaRPr lang="en-US" sz="2000" dirty="0" smtClean="0">
-              <a:ln w="0"/>
-              <a:solidFill>
-                <a:schemeClr val="tx1"/>
-              </a:solidFill>
-            </a:endParaRPr>
           </a:p>
         </p:txBody>
       </p:sp>
@@ -6819,23 +6793,7 @@
                   </a:outerShdw>
                 </a:effectLst>
               </a:rPr>
-              <a:t>Definition of </a:t>
-            </a:r>
-            <a:r>
-              <a:rPr lang="en-US" sz="2000" dirty="0" smtClean="0">
-                <a:ln w="0"/>
-                <a:solidFill>
-                  <a:schemeClr val="accent1"/>
-                </a:solidFill>
-                <a:effectLst>
-                  <a:outerShdw blurRad="38100" dist="38100" dir="2700000" algn="tl">
-                    <a:srgbClr val="000000">
-                      <a:alpha val="43137"/>
-                    </a:srgbClr>
-                  </a:outerShdw>
-                </a:effectLst>
-              </a:rPr>
-              <a:t>done</a:t>
+              <a:t>Definition of done</a:t>
             </a:r>
           </a:p>
           <a:p>
@@ -6976,13 +6934,8 @@
           <a:p>
             <a:r>
               <a:rPr lang="en-US" dirty="0" smtClean="0"/>
-              <a:t>Further p</a:t>
-            </a:r>
-            <a:r>
-              <a:rPr lang="en-US" dirty="0" smtClean="0"/>
-              <a:t>olish the design</a:t>
-            </a:r>
-            <a:endParaRPr lang="en-US" dirty="0" smtClean="0"/>
+              <a:t>Further polish the design</a:t>
+            </a:r>
           </a:p>
         </p:txBody>
       </p:sp>
@@ -7080,7 +7033,28 @@
           <a:bodyPr/>
           <a:lstStyle/>
           <a:p>
-            <a:endParaRPr lang="ro-RO" dirty="0"/>
+            <a:r>
+              <a:rPr lang="en-US" dirty="0" smtClean="0"/>
+              <a:t>Added edit component</a:t>
+            </a:r>
+          </a:p>
+          <a:p>
+            <a:r>
+              <a:rPr lang="en-US" dirty="0" smtClean="0"/>
+              <a:t>Added pictures to each event type on map</a:t>
+            </a:r>
+          </a:p>
+          <a:p>
+            <a:r>
+              <a:rPr lang="en-US" dirty="0" smtClean="0"/>
+              <a:t>Finishing touches to the site’s look</a:t>
+            </a:r>
+          </a:p>
+          <a:p>
+            <a:r>
+              <a:rPr lang="en-US" dirty="0" smtClean="0"/>
+              <a:t>Integrated all other modules</a:t>
+            </a:r>
           </a:p>
         </p:txBody>
       </p:sp>
@@ -7274,8 +7248,8 @@
         </p:nvSpPr>
         <p:spPr>
           <a:xfrm>
-            <a:off x="7329690" y="2438399"/>
-            <a:ext cx="3677944" cy="646331"/>
+            <a:off x="7329690" y="2194559"/>
+            <a:ext cx="3677944" cy="1754326"/>
           </a:xfrm>
           <a:prstGeom prst="rect">
             <a:avLst/>
@@ -7331,6 +7305,60 @@
               <a:buFont typeface="Arial" panose="020B0604020202020204" pitchFamily="34" charset="0"/>
               <a:buChar char="•"/>
             </a:pPr>
+            <a:r>
+              <a:rPr lang="en-US" dirty="0" smtClean="0">
+                <a:ln w="0"/>
+                <a:solidFill>
+                  <a:schemeClr val="tx1"/>
+                </a:solidFill>
+              </a:rPr>
+              <a:t>Long awaited module meetings + collaboration with other modules</a:t>
+            </a:r>
+          </a:p>
+          <a:p>
+            <a:pPr marL="285750" indent="-285750">
+              <a:buClr>
+                <a:schemeClr val="accent1"/>
+              </a:buClr>
+              <a:buFont typeface="Arial" panose="020B0604020202020204" pitchFamily="34" charset="0"/>
+              <a:buChar char="•"/>
+            </a:pPr>
+            <a:r>
+              <a:rPr lang="en-US" dirty="0" smtClean="0">
+                <a:ln w="0"/>
+                <a:solidFill>
+                  <a:schemeClr val="tx1"/>
+                </a:solidFill>
+              </a:rPr>
+              <a:t>Support from teammates</a:t>
+            </a:r>
+          </a:p>
+          <a:p>
+            <a:pPr marL="285750" indent="-285750">
+              <a:buClr>
+                <a:schemeClr val="accent1"/>
+              </a:buClr>
+              <a:buFont typeface="Arial" panose="020B0604020202020204" pitchFamily="34" charset="0"/>
+              <a:buChar char="•"/>
+            </a:pPr>
+            <a:r>
+              <a:rPr lang="en-US" dirty="0" smtClean="0">
+                <a:ln w="0"/>
+                <a:solidFill>
+                  <a:schemeClr val="tx1"/>
+                </a:solidFill>
+              </a:rPr>
+              <a:t>Diversifying tasks</a:t>
+            </a:r>
+          </a:p>
+          <a:p>
+            <a:pPr marL="285750" indent="-285750">
+              <a:buClr>
+                <a:schemeClr val="accent1"/>
+              </a:buClr>
+              <a:buFont typeface="Arial" panose="020B0604020202020204" pitchFamily="34" charset="0"/>
+              <a:buChar char="•"/>
+            </a:pPr>
             <a:endParaRPr lang="en-US" dirty="0" smtClean="0">
               <a:ln w="0"/>
               <a:solidFill>
@@ -7349,7 +7377,7 @@
         <p:spPr>
           <a:xfrm>
             <a:off x="7329690" y="4293326"/>
-            <a:ext cx="3677944" cy="646331"/>
+            <a:ext cx="3677944" cy="1200329"/>
           </a:xfrm>
           <a:prstGeom prst="rect">
             <a:avLst/>
@@ -7390,23 +7418,7 @@
                   </a:outerShdw>
                 </a:effectLst>
               </a:rPr>
-              <a:t>To be </a:t>
-            </a:r>
-            <a:r>
-              <a:rPr lang="en-US" b="1" dirty="0" smtClean="0">
-                <a:ln w="0"/>
-                <a:solidFill>
-                  <a:schemeClr val="accent1"/>
-                </a:solidFill>
-                <a:effectLst>
-                  <a:outerShdw blurRad="38100" dist="25400" dir="5400000" algn="ctr" rotWithShape="0">
-                    <a:srgbClr val="6E747A">
-                      <a:alpha val="43000"/>
-                    </a:srgbClr>
-                  </a:outerShdw>
-                </a:effectLst>
-              </a:rPr>
-              <a:t>improved</a:t>
+              <a:t>To be improved</a:t>
             </a:r>
           </a:p>
           <a:p>
@@ -7419,7 +7431,20 @@
             </a:pPr>
             <a:r>
               <a:rPr lang="en-US" dirty="0" smtClean="0"/>
-              <a:t>Lack of module meeting</a:t>
+              <a:t>Slight loss of overall picture</a:t>
+            </a:r>
+          </a:p>
+          <a:p>
+            <a:pPr marL="285750" indent="-285750">
+              <a:buClr>
+                <a:schemeClr val="accent1"/>
+              </a:buClr>
+              <a:buFont typeface="Arial" panose="020B0604020202020204" pitchFamily="34" charset="0"/>
+              <a:buChar char="•"/>
+            </a:pPr>
+            <a:r>
+              <a:rPr lang="en-US" dirty="0" smtClean="0"/>
+              <a:t>Choosing the right formula for large meetings</a:t>
             </a:r>
             <a:endParaRPr lang="en-US" dirty="0" smtClean="0"/>
           </a:p>
@@ -7511,19 +7536,6 @@
               </a:rPr>
               <a:t>Arhip Andrei</a:t>
             </a:r>
-            <a:endParaRPr lang="en-US" b="1" dirty="0" smtClean="0">
-              <a:ln w="0"/>
-              <a:solidFill>
-                <a:schemeClr val="accent1"/>
-              </a:solidFill>
-              <a:effectLst>
-                <a:outerShdw blurRad="38100" dist="25400" dir="5400000" algn="ctr" rotWithShape="0">
-                  <a:srgbClr val="6E747A">
-                    <a:alpha val="43000"/>
-                  </a:srgbClr>
-                </a:outerShdw>
-              </a:effectLst>
-            </a:endParaRPr>
           </a:p>
           <a:p>
             <a:pPr marL="285750" indent="-285750">
@@ -7614,12 +7626,6 @@
               </a:rPr>
               <a:t>Design elements</a:t>
             </a:r>
-            <a:endParaRPr lang="en-US" dirty="0" smtClean="0">
-              <a:ln w="0"/>
-              <a:solidFill>
-                <a:schemeClr val="tx1"/>
-              </a:solidFill>
-            </a:endParaRPr>
           </a:p>
         </p:txBody>
       </p:sp>
@@ -7695,19 +7701,6 @@
               </a:rPr>
               <a:t> Dan</a:t>
             </a:r>
-            <a:endParaRPr lang="en-US" b="1" dirty="0" smtClean="0">
-              <a:ln w="0"/>
-              <a:solidFill>
-                <a:schemeClr val="accent1"/>
-              </a:solidFill>
-              <a:effectLst>
-                <a:outerShdw blurRad="38100" dist="25400" dir="5400000" algn="ctr" rotWithShape="0">
-                  <a:srgbClr val="6E747A">
-                    <a:alpha val="43000"/>
-                  </a:srgbClr>
-                </a:outerShdw>
-              </a:effectLst>
-            </a:endParaRPr>
           </a:p>
           <a:p>
             <a:pPr marL="285750" indent="-285750">
@@ -7762,12 +7755,6 @@
               </a:rPr>
               <a:t>Overall design</a:t>
             </a:r>
-            <a:endParaRPr lang="en-US" dirty="0" smtClean="0">
-              <a:ln w="0"/>
-              <a:solidFill>
-                <a:schemeClr val="tx1"/>
-              </a:solidFill>
-            </a:endParaRPr>
           </a:p>
         </p:txBody>
       </p:sp>
@@ -7908,12 +7895,6 @@
               </a:rPr>
               <a:t>Dashboard, Event List, Event Detail</a:t>
             </a:r>
-            <a:endParaRPr lang="en-US" dirty="0" smtClean="0">
-              <a:ln w="0"/>
-              <a:solidFill>
-                <a:schemeClr val="tx1"/>
-              </a:solidFill>
-            </a:endParaRPr>
           </a:p>
         </p:txBody>
       </p:sp>
@@ -8060,12 +8041,6 @@
               </a:rPr>
               <a:t>Font</a:t>
             </a:r>
-            <a:endParaRPr lang="en-US" dirty="0" smtClean="0">
-              <a:ln w="0"/>
-              <a:solidFill>
-                <a:schemeClr val="tx1"/>
-              </a:solidFill>
-            </a:endParaRPr>
           </a:p>
         </p:txBody>
       </p:sp>
@@ -8206,12 +8181,6 @@
               </a:rPr>
               <a:t>Dashboard, Event List, Event Detail</a:t>
             </a:r>
-            <a:endParaRPr lang="en-US" dirty="0" smtClean="0">
-              <a:ln w="0"/>
-              <a:solidFill>
-                <a:schemeClr val="tx1"/>
-              </a:solidFill>
-            </a:endParaRPr>
           </a:p>
         </p:txBody>
       </p:sp>
@@ -9290,15 +9259,7 @@
           <a:p>
             <a:r>
               <a:rPr lang="en-US" dirty="0" smtClean="0"/>
-              <a:t>PBI – </a:t>
-            </a:r>
-            <a:r>
-              <a:rPr lang="en-US" dirty="0" smtClean="0"/>
-              <a:t>End to End Testing </a:t>
-            </a:r>
-            <a:r>
-              <a:rPr lang="en-US" dirty="0" smtClean="0"/>
-              <a:t>and Unit Testing</a:t>
+              <a:t>PBI – End to End Testing and Unit Testing</a:t>
             </a:r>
             <a:endParaRPr lang="ro-RO" dirty="0"/>
           </a:p>
@@ -9368,8 +9329,10 @@
                   <a:schemeClr val="tx1"/>
                 </a:solidFill>
               </a:rPr>
-              <a:t>Understanding Unit Tests and their purpose + </a:t>
-            </a:r>
+              <a:t>Understanding Unit Tests and their purpose + utility</a:t>
+            </a:r>
+          </a:p>
+          <a:p>
             <a:r>
               <a:rPr lang="en-US" sz="2000" dirty="0" smtClean="0">
                 <a:ln w="0"/>
@@ -9377,25 +9340,8 @@
                   <a:schemeClr val="tx1"/>
                 </a:solidFill>
               </a:rPr>
-              <a:t>utility</a:t>
-            </a:r>
-          </a:p>
-          <a:p>
-            <a:r>
-              <a:rPr lang="en-US" sz="2000" dirty="0" smtClean="0">
-                <a:ln w="0"/>
-                <a:solidFill>
-                  <a:schemeClr val="tx1"/>
-                </a:solidFill>
-              </a:rPr>
               <a:t>Discovering and implementing End to End testing</a:t>
             </a:r>
-            <a:endParaRPr lang="en-US" sz="2000" dirty="0" smtClean="0">
-              <a:ln w="0"/>
-              <a:solidFill>
-                <a:schemeClr val="tx1"/>
-              </a:solidFill>
-            </a:endParaRPr>
           </a:p>
         </p:txBody>
       </p:sp>
@@ -9691,8 +9637,10 @@
                   <a:schemeClr val="tx1"/>
                 </a:solidFill>
               </a:rPr>
-              <a:t>Successfully testing main </a:t>
-            </a:r>
+              <a:t>Successfully testing main services</a:t>
+            </a:r>
+          </a:p>
+          <a:p>
             <a:r>
               <a:rPr lang="en-US" sz="2000" dirty="0" smtClean="0">
                 <a:ln w="0"/>
@@ -9700,25 +9648,8 @@
                   <a:schemeClr val="tx1"/>
                 </a:solidFill>
               </a:rPr>
-              <a:t>services</a:t>
-            </a:r>
-          </a:p>
-          <a:p>
-            <a:r>
-              <a:rPr lang="en-US" sz="2000" dirty="0" smtClean="0">
-                <a:ln w="0"/>
-                <a:solidFill>
-                  <a:schemeClr val="tx1"/>
-                </a:solidFill>
-              </a:rPr>
               <a:t>Testing secondary elements</a:t>
             </a:r>
-            <a:endParaRPr lang="en-US" sz="2000" dirty="0" smtClean="0">
-              <a:ln w="0"/>
-              <a:solidFill>
-                <a:schemeClr val="tx1"/>
-              </a:solidFill>
-            </a:endParaRPr>
           </a:p>
         </p:txBody>
       </p:sp>
@@ -9769,11 +9700,7 @@
           <a:p>
             <a:r>
               <a:rPr lang="en-US" dirty="0" smtClean="0"/>
-              <a:t>PBI – </a:t>
-            </a:r>
-            <a:r>
-              <a:rPr lang="en-US" dirty="0" smtClean="0"/>
-              <a:t>Map Functionality</a:t>
+              <a:t>PBI – Map Functionality</a:t>
             </a:r>
             <a:endParaRPr lang="ro-RO" dirty="0"/>
           </a:p>
@@ -9885,12 +9812,6 @@
               </a:rPr>
               <a:t>API key from Google Maps</a:t>
             </a:r>
-            <a:endParaRPr lang="en-US" sz="2000" dirty="0" smtClean="0">
-              <a:ln w="0"/>
-              <a:solidFill>
-                <a:schemeClr val="tx1"/>
-              </a:solidFill>
-            </a:endParaRPr>
           </a:p>
         </p:txBody>
       </p:sp>
@@ -9904,7 +9825,7 @@
         </p:nvSpPr>
         <p:spPr>
           <a:xfrm>
-            <a:off x="7268731" y="2336072"/>
+            <a:off x="7313236" y="2336072"/>
             <a:ext cx="3669236" cy="3394168"/>
           </a:xfrm>
           <a:prstGeom prst="rect">
@@ -10175,23 +10096,18 @@
                   </a:outerShdw>
                 </a:effectLst>
               </a:rPr>
-              <a:t>Definition of </a:t>
-            </a:r>
+              <a:t>Definition of done</a:t>
+            </a:r>
+          </a:p>
+          <a:p>
             <a:r>
               <a:rPr lang="en-US" sz="2000" dirty="0" smtClean="0">
                 <a:ln w="0"/>
                 <a:solidFill>
-                  <a:schemeClr val="accent1"/>
-                </a:solidFill>
-                <a:effectLst>
-                  <a:outerShdw blurRad="38100" dist="38100" dir="2700000" algn="tl">
-                    <a:srgbClr val="000000">
-                      <a:alpha val="43137"/>
-                    </a:srgbClr>
-                  </a:outerShdw>
-                </a:effectLst>
-              </a:rPr>
-              <a:t>done</a:t>
+                  <a:schemeClr val="tx1"/>
+                </a:solidFill>
+              </a:rPr>
+              <a:t>Integrating map component within the application</a:t>
             </a:r>
           </a:p>
           <a:p>
@@ -10202,7 +10118,7 @@
                   <a:schemeClr val="tx1"/>
                 </a:solidFill>
               </a:rPr>
-              <a:t>Integrating map component within the application</a:t>
+              <a:t>Getting input from map</a:t>
             </a:r>
           </a:p>
           <a:p>
@@ -10213,10 +10129,8 @@
                   <a:schemeClr val="tx1"/>
                 </a:solidFill>
               </a:rPr>
-              <a:t>Getting input from map</a:t>
-            </a:r>
-          </a:p>
-          <a:p>
+              <a:t>Adding custom zone </a:t>
+            </a:r>
             <a:r>
               <a:rPr lang="en-US" sz="2000" dirty="0" smtClean="0">
                 <a:ln w="0"/>
@@ -10224,14 +10138,37 @@
                   <a:schemeClr val="tx1"/>
                 </a:solidFill>
               </a:rPr>
-              <a:t>Adding custom zone markers</a:t>
-            </a:r>
-            <a:endParaRPr lang="en-US" sz="2000" dirty="0" smtClean="0">
-              <a:ln w="0"/>
-              <a:solidFill>
-                <a:schemeClr val="accent1"/>
-              </a:solidFill>
-            </a:endParaRPr>
+              <a:t>markers</a:t>
+            </a:r>
+          </a:p>
+          <a:p>
+            <a:r>
+              <a:rPr lang="en-US" sz="2000" dirty="0" smtClean="0">
+                <a:ln w="0"/>
+                <a:solidFill>
+                  <a:schemeClr val="tx1"/>
+                </a:solidFill>
+              </a:rPr>
+              <a:t>Adding custom icons</a:t>
+            </a:r>
+            <a:r>
+              <a:rPr lang="en-US" sz="2000" dirty="0">
+                <a:ln w="0"/>
+                <a:solidFill>
+                  <a:schemeClr val="accent1"/>
+                </a:solidFill>
+              </a:rPr>
+              <a:t> </a:t>
+            </a:r>
+            <a:r>
+              <a:rPr lang="en-US" sz="2000" dirty="0" smtClean="0">
+                <a:ln w="0"/>
+                <a:solidFill>
+                  <a:schemeClr val="tx1"/>
+                </a:solidFill>
+              </a:rPr>
+              <a:t>+ legend</a:t>
+            </a:r>
           </a:p>
         </p:txBody>
       </p:sp>

</xml_diff>